<commit_message>
Se versiona cambio en la presentación, con el tema de los nombres de los miembros
</commit_message>
<xml_diff>
--- a/SGP(Sistema de Gestion de Proyectos).pptx
+++ b/SGP(Sistema de Gestion de Proyectos).pptx
@@ -266,7 +266,7 @@
           <a:p>
             <a:fld id="{DC72B42F-2EB9-470A-A234-F9B20043162E}" type="datetimeFigureOut">
               <a:rPr lang="es-GT" smtClean="0"/>
-              <a:t>9/08/2024</a:t>
+              <a:t>10/08/2024</a:t>
             </a:fld>
             <a:endParaRPr lang="es-GT"/>
           </a:p>
@@ -466,7 +466,7 @@
           <a:p>
             <a:fld id="{DC72B42F-2EB9-470A-A234-F9B20043162E}" type="datetimeFigureOut">
               <a:rPr lang="es-GT" smtClean="0"/>
-              <a:t>9/08/2024</a:t>
+              <a:t>10/08/2024</a:t>
             </a:fld>
             <a:endParaRPr lang="es-GT"/>
           </a:p>
@@ -676,7 +676,7 @@
           <a:p>
             <a:fld id="{DC72B42F-2EB9-470A-A234-F9B20043162E}" type="datetimeFigureOut">
               <a:rPr lang="es-GT" smtClean="0"/>
-              <a:t>9/08/2024</a:t>
+              <a:t>10/08/2024</a:t>
             </a:fld>
             <a:endParaRPr lang="es-GT"/>
           </a:p>
@@ -876,7 +876,7 @@
           <a:p>
             <a:fld id="{DC72B42F-2EB9-470A-A234-F9B20043162E}" type="datetimeFigureOut">
               <a:rPr lang="es-GT" smtClean="0"/>
-              <a:t>9/08/2024</a:t>
+              <a:t>10/08/2024</a:t>
             </a:fld>
             <a:endParaRPr lang="es-GT"/>
           </a:p>
@@ -1152,7 +1152,7 @@
           <a:p>
             <a:fld id="{DC72B42F-2EB9-470A-A234-F9B20043162E}" type="datetimeFigureOut">
               <a:rPr lang="es-GT" smtClean="0"/>
-              <a:t>9/08/2024</a:t>
+              <a:t>10/08/2024</a:t>
             </a:fld>
             <a:endParaRPr lang="es-GT"/>
           </a:p>
@@ -1420,7 +1420,7 @@
           <a:p>
             <a:fld id="{DC72B42F-2EB9-470A-A234-F9B20043162E}" type="datetimeFigureOut">
               <a:rPr lang="es-GT" smtClean="0"/>
-              <a:t>9/08/2024</a:t>
+              <a:t>10/08/2024</a:t>
             </a:fld>
             <a:endParaRPr lang="es-GT"/>
           </a:p>
@@ -1835,7 +1835,7 @@
           <a:p>
             <a:fld id="{DC72B42F-2EB9-470A-A234-F9B20043162E}" type="datetimeFigureOut">
               <a:rPr lang="es-GT" smtClean="0"/>
-              <a:t>9/08/2024</a:t>
+              <a:t>10/08/2024</a:t>
             </a:fld>
             <a:endParaRPr lang="es-GT"/>
           </a:p>
@@ -1977,7 +1977,7 @@
           <a:p>
             <a:fld id="{DC72B42F-2EB9-470A-A234-F9B20043162E}" type="datetimeFigureOut">
               <a:rPr lang="es-GT" smtClean="0"/>
-              <a:t>9/08/2024</a:t>
+              <a:t>10/08/2024</a:t>
             </a:fld>
             <a:endParaRPr lang="es-GT"/>
           </a:p>
@@ -2090,7 +2090,7 @@
           <a:p>
             <a:fld id="{DC72B42F-2EB9-470A-A234-F9B20043162E}" type="datetimeFigureOut">
               <a:rPr lang="es-GT" smtClean="0"/>
-              <a:t>9/08/2024</a:t>
+              <a:t>10/08/2024</a:t>
             </a:fld>
             <a:endParaRPr lang="es-GT"/>
           </a:p>
@@ -2403,7 +2403,7 @@
           <a:p>
             <a:fld id="{DC72B42F-2EB9-470A-A234-F9B20043162E}" type="datetimeFigureOut">
               <a:rPr lang="es-GT" smtClean="0"/>
-              <a:t>9/08/2024</a:t>
+              <a:t>10/08/2024</a:t>
             </a:fld>
             <a:endParaRPr lang="es-GT"/>
           </a:p>
@@ -2692,7 +2692,7 @@
           <a:p>
             <a:fld id="{DC72B42F-2EB9-470A-A234-F9B20043162E}" type="datetimeFigureOut">
               <a:rPr lang="es-GT" smtClean="0"/>
-              <a:t>9/08/2024</a:t>
+              <a:t>10/08/2024</a:t>
             </a:fld>
             <a:endParaRPr lang="es-GT"/>
           </a:p>
@@ -2935,7 +2935,7 @@
           <a:p>
             <a:fld id="{DC72B42F-2EB9-470A-A234-F9B20043162E}" type="datetimeFigureOut">
               <a:rPr lang="es-GT" smtClean="0"/>
-              <a:t>9/08/2024</a:t>
+              <a:t>10/08/2024</a:t>
             </a:fld>
             <a:endParaRPr lang="es-GT"/>
           </a:p>
@@ -3494,19 +3494,19 @@
         </p:nvSpPr>
         <p:spPr>
           <a:xfrm>
-            <a:off x="1208228" y="5972174"/>
+            <a:off x="1415852" y="4064716"/>
             <a:ext cx="8578699" cy="504825"/>
           </a:xfrm>
         </p:spPr>
         <p:txBody>
           <a:bodyPr>
-            <a:normAutofit fontScale="85000" lnSpcReduction="10000"/>
+            <a:noAutofit/>
           </a:bodyPr>
           <a:lstStyle/>
           <a:p>
             <a:pPr algn="l"/>
             <a:r>
-              <a:rPr lang="es-GT" sz="500">
+              <a:rPr lang="es-GT" sz="4800" dirty="0">
                 <a:solidFill>
                   <a:srgbClr val="FFFFFF"/>
                 </a:solidFill>
@@ -3517,23 +3517,52 @@
           <a:p>
             <a:pPr algn="l"/>
             <a:r>
-              <a:rPr lang="es-GT" sz="500">
+              <a:rPr lang="es-GT" sz="4800" dirty="0" err="1">
                 <a:solidFill>
                   <a:srgbClr val="FFFFFF"/>
                 </a:solidFill>
               </a:rPr>
-              <a:t>Mercy Garcia</a:t>
-            </a:r>
-          </a:p>
-          <a:p>
-            <a:pPr algn="l"/>
-            <a:r>
-              <a:rPr lang="es-GT" sz="500">
+              <a:t>Mercy</a:t>
+            </a:r>
+            <a:r>
+              <a:rPr lang="es-GT" sz="4800" dirty="0">
                 <a:solidFill>
                   <a:srgbClr val="FFFFFF"/>
                 </a:solidFill>
               </a:rPr>
-              <a:t>Angel Enrique</a:t>
+              <a:t> </a:t>
+            </a:r>
+            <a:r>
+              <a:rPr lang="es-GT" sz="4800" dirty="0" err="1">
+                <a:solidFill>
+                  <a:srgbClr val="FFFFFF"/>
+                </a:solidFill>
+              </a:rPr>
+              <a:t>Garcia</a:t>
+            </a:r>
+            <a:endParaRPr lang="es-GT" sz="4800" dirty="0">
+              <a:solidFill>
+                <a:srgbClr val="FFFFFF"/>
+              </a:solidFill>
+            </a:endParaRPr>
+          </a:p>
+          <a:p>
+            <a:pPr algn="l"/>
+            <a:r>
+              <a:rPr lang="es-GT" sz="4800" dirty="0" err="1">
+                <a:solidFill>
+                  <a:srgbClr val="FFFFFF"/>
+                </a:solidFill>
+              </a:rPr>
+              <a:t>Angel</a:t>
+            </a:r>
+            <a:r>
+              <a:rPr lang="es-GT" sz="4800" dirty="0">
+                <a:solidFill>
+                  <a:srgbClr val="FFFFFF"/>
+                </a:solidFill>
+              </a:rPr>
+              <a:t> Enrique</a:t>
             </a:r>
           </a:p>
         </p:txBody>

</xml_diff>